<commit_message>
Inserimento foto con relativo xml da 191 a 300
</commit_message>
<xml_diff>
--- a/documentazione/Presentazione fia.pptx
+++ b/documentazione/Presentazione fia.pptx
@@ -112,6 +112,11 @@
       </a:defRPr>
     </a:lvl9pPr>
   </p:defaultTextStyle>
+  <p:extLst>
+    <p:ext uri="{EFAFB233-063F-42B5-8137-9DF3F51BA10A}">
+      <p15:sldGuideLst xmlns:p15="http://schemas.microsoft.com/office/powerpoint/2012/main"/>
+    </p:ext>
+  </p:extLst>
 </p:presentation>
 </file>
 
@@ -303,7 +308,7 @@
           <a:p>
             <a:fld id="{D3007E90-0CF4-4B56-9D2F-9833898221B1}" type="datetimeFigureOut">
               <a:rPr lang="it-IT" smtClean="0"/>
-              <a:t>10/05/2022</a:t>
+              <a:t>17/05/2022</a:t>
             </a:fld>
             <a:endParaRPr lang="it-IT"/>
           </a:p>
@@ -641,7 +646,7 @@
           <a:p>
             <a:fld id="{D3007E90-0CF4-4B56-9D2F-9833898221B1}" type="datetimeFigureOut">
               <a:rPr lang="it-IT" smtClean="0"/>
-              <a:t>10/05/2022</a:t>
+              <a:t>17/05/2022</a:t>
             </a:fld>
             <a:endParaRPr lang="it-IT"/>
           </a:p>
@@ -1042,7 +1047,7 @@
           <a:p>
             <a:fld id="{D3007E90-0CF4-4B56-9D2F-9833898221B1}" type="datetimeFigureOut">
               <a:rPr lang="it-IT" smtClean="0"/>
-              <a:t>10/05/2022</a:t>
+              <a:t>17/05/2022</a:t>
             </a:fld>
             <a:endParaRPr lang="it-IT"/>
           </a:p>
@@ -1378,7 +1383,7 @@
           <a:p>
             <a:fld id="{D3007E90-0CF4-4B56-9D2F-9833898221B1}" type="datetimeFigureOut">
               <a:rPr lang="it-IT" smtClean="0"/>
-              <a:t>10/05/2022</a:t>
+              <a:t>17/05/2022</a:t>
             </a:fld>
             <a:endParaRPr lang="it-IT"/>
           </a:p>
@@ -1698,7 +1703,7 @@
           <a:p>
             <a:fld id="{D3007E90-0CF4-4B56-9D2F-9833898221B1}" type="datetimeFigureOut">
               <a:rPr lang="it-IT" smtClean="0"/>
-              <a:t>10/05/2022</a:t>
+              <a:t>17/05/2022</a:t>
             </a:fld>
             <a:endParaRPr lang="it-IT"/>
           </a:p>
@@ -2094,7 +2099,7 @@
           <a:p>
             <a:fld id="{D3007E90-0CF4-4B56-9D2F-9833898221B1}" type="datetimeFigureOut">
               <a:rPr lang="it-IT" smtClean="0"/>
-              <a:t>10/05/2022</a:t>
+              <a:t>17/05/2022</a:t>
             </a:fld>
             <a:endParaRPr lang="it-IT"/>
           </a:p>
@@ -2351,7 +2356,7 @@
           <a:p>
             <a:fld id="{D3007E90-0CF4-4B56-9D2F-9833898221B1}" type="datetimeFigureOut">
               <a:rPr lang="it-IT" smtClean="0"/>
-              <a:t>10/05/2022</a:t>
+              <a:t>17/05/2022</a:t>
             </a:fld>
             <a:endParaRPr lang="it-IT"/>
           </a:p>
@@ -2613,7 +2618,7 @@
           <a:p>
             <a:fld id="{D3007E90-0CF4-4B56-9D2F-9833898221B1}" type="datetimeFigureOut">
               <a:rPr lang="it-IT" smtClean="0"/>
-              <a:t>10/05/2022</a:t>
+              <a:t>17/05/2022</a:t>
             </a:fld>
             <a:endParaRPr lang="it-IT"/>
           </a:p>
@@ -2875,7 +2880,7 @@
           <a:p>
             <a:fld id="{D3007E90-0CF4-4B56-9D2F-9833898221B1}" type="datetimeFigureOut">
               <a:rPr lang="it-IT" smtClean="0"/>
-              <a:t>10/05/2022</a:t>
+              <a:t>17/05/2022</a:t>
             </a:fld>
             <a:endParaRPr lang="it-IT"/>
           </a:p>
@@ -3204,7 +3209,7 @@
           <a:p>
             <a:fld id="{D3007E90-0CF4-4B56-9D2F-9833898221B1}" type="datetimeFigureOut">
               <a:rPr lang="it-IT" smtClean="0"/>
-              <a:t>10/05/2022</a:t>
+              <a:t>17/05/2022</a:t>
             </a:fld>
             <a:endParaRPr lang="it-IT"/>
           </a:p>
@@ -3527,7 +3532,7 @@
           <a:p>
             <a:fld id="{D3007E90-0CF4-4B56-9D2F-9833898221B1}" type="datetimeFigureOut">
               <a:rPr lang="it-IT" smtClean="0"/>
-              <a:t>10/05/2022</a:t>
+              <a:t>17/05/2022</a:t>
             </a:fld>
             <a:endParaRPr lang="it-IT"/>
           </a:p>
@@ -3984,7 +3989,7 @@
           <a:p>
             <a:fld id="{D3007E90-0CF4-4B56-9D2F-9833898221B1}" type="datetimeFigureOut">
               <a:rPr lang="it-IT" smtClean="0"/>
-              <a:t>10/05/2022</a:t>
+              <a:t>17/05/2022</a:t>
             </a:fld>
             <a:endParaRPr lang="it-IT"/>
           </a:p>
@@ -4189,7 +4194,7 @@
           <a:p>
             <a:fld id="{D3007E90-0CF4-4B56-9D2F-9833898221B1}" type="datetimeFigureOut">
               <a:rPr lang="it-IT" smtClean="0"/>
-              <a:t>10/05/2022</a:t>
+              <a:t>17/05/2022</a:t>
             </a:fld>
             <a:endParaRPr lang="it-IT"/>
           </a:p>
@@ -4366,7 +4371,7 @@
           <a:p>
             <a:fld id="{D3007E90-0CF4-4B56-9D2F-9833898221B1}" type="datetimeFigureOut">
               <a:rPr lang="it-IT" smtClean="0"/>
-              <a:t>10/05/2022</a:t>
+              <a:t>17/05/2022</a:t>
             </a:fld>
             <a:endParaRPr lang="it-IT"/>
           </a:p>
@@ -4699,7 +4704,7 @@
           <a:p>
             <a:fld id="{D3007E90-0CF4-4B56-9D2F-9833898221B1}" type="datetimeFigureOut">
               <a:rPr lang="it-IT" smtClean="0"/>
-              <a:t>10/05/2022</a:t>
+              <a:t>17/05/2022</a:t>
             </a:fld>
             <a:endParaRPr lang="it-IT"/>
           </a:p>
@@ -5044,7 +5049,7 @@
           <a:p>
             <a:fld id="{D3007E90-0CF4-4B56-9D2F-9833898221B1}" type="datetimeFigureOut">
               <a:rPr lang="it-IT" smtClean="0"/>
-              <a:t>10/05/2022</a:t>
+              <a:t>17/05/2022</a:t>
             </a:fld>
             <a:endParaRPr lang="it-IT"/>
           </a:p>
@@ -7161,7 +7166,7 @@
           <a:p>
             <a:fld id="{D3007E90-0CF4-4B56-9D2F-9833898221B1}" type="datetimeFigureOut">
               <a:rPr lang="it-IT" smtClean="0"/>
-              <a:t>10/05/2022</a:t>
+              <a:t>17/05/2022</a:t>
             </a:fld>
             <a:endParaRPr lang="it-IT"/>
           </a:p>
@@ -7791,7 +7796,7 @@
         </p:nvSpPr>
         <p:spPr>
           <a:xfrm>
-            <a:off x="720191" y="3913499"/>
+            <a:off x="645546" y="1678097"/>
             <a:ext cx="3908453" cy="1477328"/>
           </a:xfrm>
           <a:prstGeom prst="rect">
@@ -7889,7 +7894,7 @@
         </p:nvSpPr>
         <p:spPr>
           <a:xfrm>
-            <a:off x="4426344" y="3894269"/>
+            <a:off x="4202409" y="3149498"/>
             <a:ext cx="3633324" cy="1477328"/>
           </a:xfrm>
           <a:prstGeom prst="rect">
@@ -7965,7 +7970,7 @@
         </p:nvSpPr>
         <p:spPr>
           <a:xfrm>
-            <a:off x="8334797" y="3894269"/>
+            <a:off x="7835733" y="4626826"/>
             <a:ext cx="3762797" cy="1754326"/>
           </a:xfrm>
           <a:prstGeom prst="rect">
@@ -8674,15 +8679,7 @@
           <a:p>
             <a:r>
               <a:rPr lang="it-IT" dirty="0"/>
-              <a:t>La rete </a:t>
-            </a:r>
-            <a:r>
-              <a:rPr lang="it-IT" dirty="0" err="1"/>
-              <a:t>convoluzionale</a:t>
-            </a:r>
-            <a:r>
-              <a:rPr lang="it-IT" dirty="0"/>
-              <a:t> è risultato l’algoritmo migliore per questa tipologia di progetto</a:t>
+              <a:t>La rete convoluzionale è risultato l’algoritmo migliore per questa tipologia di progetto</a:t>
             </a:r>
           </a:p>
           <a:p>
@@ -8698,15 +8695,7 @@
             </a:pPr>
             <a:r>
               <a:rPr lang="it-IT" dirty="0"/>
-              <a:t>L’algoritmo CNN è progettato per riconoscere immagini in modo diretto non richiedendo una grande quantità di </a:t>
-            </a:r>
-            <a:r>
-              <a:rPr lang="it-IT" dirty="0" err="1"/>
-              <a:t>preprocessing</a:t>
-            </a:r>
-            <a:r>
-              <a:rPr lang="it-IT" dirty="0"/>
-              <a:t>.</a:t>
+              <a:t>L’algoritmo CNN è progettato per riconoscere immagini in modo diretto non richiedendo una grande quantità di preprocessing.</a:t>
             </a:r>
           </a:p>
           <a:p>
@@ -8869,13 +8858,8 @@
           <a:p>
             <a:r>
               <a:rPr lang="it-IT" dirty="0"/>
-              <a:t> Link </a:t>
-            </a:r>
-            <a:r>
-              <a:rPr lang="it-IT"/>
-              <a:t>dataset originale: </a:t>
-            </a:r>
-            <a:endParaRPr lang="it-IT" dirty="0"/>
+              <a:t> Link dataset originale: </a:t>
+            </a:r>
           </a:p>
         </p:txBody>
       </p:sp>

</xml_diff>

<commit_message>
Aggiunta specifica PEAS, analisi del problema e dataset
</commit_message>
<xml_diff>
--- a/documentazione/Presentazione fia.pptx
+++ b/documentazione/Presentazione fia.pptx
@@ -13,7 +13,9 @@
     <p:sldId id="261" r:id="rId7"/>
     <p:sldId id="262" r:id="rId8"/>
     <p:sldId id="263" r:id="rId9"/>
-    <p:sldId id="264" r:id="rId10"/>
+    <p:sldId id="266" r:id="rId10"/>
+    <p:sldId id="264" r:id="rId11"/>
+    <p:sldId id="265" r:id="rId12"/>
   </p:sldIdLst>
   <p:sldSz cx="12192000" cy="6858000"/>
   <p:notesSz cx="6858000" cy="9144000"/>
@@ -308,7 +310,7 @@
           <a:p>
             <a:fld id="{D3007E90-0CF4-4B56-9D2F-9833898221B1}" type="datetimeFigureOut">
               <a:rPr lang="it-IT" smtClean="0"/>
-              <a:t>17/05/2022</a:t>
+              <a:t>31/05/2022</a:t>
             </a:fld>
             <a:endParaRPr lang="it-IT"/>
           </a:p>
@@ -646,7 +648,7 @@
           <a:p>
             <a:fld id="{D3007E90-0CF4-4B56-9D2F-9833898221B1}" type="datetimeFigureOut">
               <a:rPr lang="it-IT" smtClean="0"/>
-              <a:t>17/05/2022</a:t>
+              <a:t>31/05/2022</a:t>
             </a:fld>
             <a:endParaRPr lang="it-IT"/>
           </a:p>
@@ -1047,7 +1049,7 @@
           <a:p>
             <a:fld id="{D3007E90-0CF4-4B56-9D2F-9833898221B1}" type="datetimeFigureOut">
               <a:rPr lang="it-IT" smtClean="0"/>
-              <a:t>17/05/2022</a:t>
+              <a:t>31/05/2022</a:t>
             </a:fld>
             <a:endParaRPr lang="it-IT"/>
           </a:p>
@@ -1383,7 +1385,7 @@
           <a:p>
             <a:fld id="{D3007E90-0CF4-4B56-9D2F-9833898221B1}" type="datetimeFigureOut">
               <a:rPr lang="it-IT" smtClean="0"/>
-              <a:t>17/05/2022</a:t>
+              <a:t>31/05/2022</a:t>
             </a:fld>
             <a:endParaRPr lang="it-IT"/>
           </a:p>
@@ -1703,7 +1705,7 @@
           <a:p>
             <a:fld id="{D3007E90-0CF4-4B56-9D2F-9833898221B1}" type="datetimeFigureOut">
               <a:rPr lang="it-IT" smtClean="0"/>
-              <a:t>17/05/2022</a:t>
+              <a:t>31/05/2022</a:t>
             </a:fld>
             <a:endParaRPr lang="it-IT"/>
           </a:p>
@@ -2099,7 +2101,7 @@
           <a:p>
             <a:fld id="{D3007E90-0CF4-4B56-9D2F-9833898221B1}" type="datetimeFigureOut">
               <a:rPr lang="it-IT" smtClean="0"/>
-              <a:t>17/05/2022</a:t>
+              <a:t>31/05/2022</a:t>
             </a:fld>
             <a:endParaRPr lang="it-IT"/>
           </a:p>
@@ -2356,7 +2358,7 @@
           <a:p>
             <a:fld id="{D3007E90-0CF4-4B56-9D2F-9833898221B1}" type="datetimeFigureOut">
               <a:rPr lang="it-IT" smtClean="0"/>
-              <a:t>17/05/2022</a:t>
+              <a:t>31/05/2022</a:t>
             </a:fld>
             <a:endParaRPr lang="it-IT"/>
           </a:p>
@@ -2618,7 +2620,7 @@
           <a:p>
             <a:fld id="{D3007E90-0CF4-4B56-9D2F-9833898221B1}" type="datetimeFigureOut">
               <a:rPr lang="it-IT" smtClean="0"/>
-              <a:t>17/05/2022</a:t>
+              <a:t>31/05/2022</a:t>
             </a:fld>
             <a:endParaRPr lang="it-IT"/>
           </a:p>
@@ -2880,7 +2882,7 @@
           <a:p>
             <a:fld id="{D3007E90-0CF4-4B56-9D2F-9833898221B1}" type="datetimeFigureOut">
               <a:rPr lang="it-IT" smtClean="0"/>
-              <a:t>17/05/2022</a:t>
+              <a:t>31/05/2022</a:t>
             </a:fld>
             <a:endParaRPr lang="it-IT"/>
           </a:p>
@@ -3209,7 +3211,7 @@
           <a:p>
             <a:fld id="{D3007E90-0CF4-4B56-9D2F-9833898221B1}" type="datetimeFigureOut">
               <a:rPr lang="it-IT" smtClean="0"/>
-              <a:t>17/05/2022</a:t>
+              <a:t>31/05/2022</a:t>
             </a:fld>
             <a:endParaRPr lang="it-IT"/>
           </a:p>
@@ -3532,7 +3534,7 @@
           <a:p>
             <a:fld id="{D3007E90-0CF4-4B56-9D2F-9833898221B1}" type="datetimeFigureOut">
               <a:rPr lang="it-IT" smtClean="0"/>
-              <a:t>17/05/2022</a:t>
+              <a:t>31/05/2022</a:t>
             </a:fld>
             <a:endParaRPr lang="it-IT"/>
           </a:p>
@@ -3989,7 +3991,7 @@
           <a:p>
             <a:fld id="{D3007E90-0CF4-4B56-9D2F-9833898221B1}" type="datetimeFigureOut">
               <a:rPr lang="it-IT" smtClean="0"/>
-              <a:t>17/05/2022</a:t>
+              <a:t>31/05/2022</a:t>
             </a:fld>
             <a:endParaRPr lang="it-IT"/>
           </a:p>
@@ -4194,7 +4196,7 @@
           <a:p>
             <a:fld id="{D3007E90-0CF4-4B56-9D2F-9833898221B1}" type="datetimeFigureOut">
               <a:rPr lang="it-IT" smtClean="0"/>
-              <a:t>17/05/2022</a:t>
+              <a:t>31/05/2022</a:t>
             </a:fld>
             <a:endParaRPr lang="it-IT"/>
           </a:p>
@@ -4371,7 +4373,7 @@
           <a:p>
             <a:fld id="{D3007E90-0CF4-4B56-9D2F-9833898221B1}" type="datetimeFigureOut">
               <a:rPr lang="it-IT" smtClean="0"/>
-              <a:t>17/05/2022</a:t>
+              <a:t>31/05/2022</a:t>
             </a:fld>
             <a:endParaRPr lang="it-IT"/>
           </a:p>
@@ -4704,7 +4706,7 @@
           <a:p>
             <a:fld id="{D3007E90-0CF4-4B56-9D2F-9833898221B1}" type="datetimeFigureOut">
               <a:rPr lang="it-IT" smtClean="0"/>
-              <a:t>17/05/2022</a:t>
+              <a:t>31/05/2022</a:t>
             </a:fld>
             <a:endParaRPr lang="it-IT"/>
           </a:p>
@@ -5049,7 +5051,7 @@
           <a:p>
             <a:fld id="{D3007E90-0CF4-4B56-9D2F-9833898221B1}" type="datetimeFigureOut">
               <a:rPr lang="it-IT" smtClean="0"/>
-              <a:t>17/05/2022</a:t>
+              <a:t>31/05/2022</a:t>
             </a:fld>
             <a:endParaRPr lang="it-IT"/>
           </a:p>
@@ -7166,7 +7168,7 @@
           <a:p>
             <a:fld id="{D3007E90-0CF4-4B56-9D2F-9833898221B1}" type="datetimeFigureOut">
               <a:rPr lang="it-IT" smtClean="0"/>
-              <a:t>17/05/2022</a:t>
+              <a:t>31/05/2022</a:t>
             </a:fld>
             <a:endParaRPr lang="it-IT"/>
           </a:p>
@@ -7670,6 +7672,32 @@
 <file path=ppt/slides/slide1.xml><?xml version="1.0" encoding="utf-8"?>
 <p:sld xmlns:a="http://schemas.openxmlformats.org/drawingml/2006/main" xmlns:r="http://schemas.openxmlformats.org/officeDocument/2006/relationships" xmlns:p="http://schemas.openxmlformats.org/presentationml/2006/main">
   <p:cSld>
+    <p:bg>
+      <p:bgPr>
+        <a:gradFill rotWithShape="1">
+          <a:gsLst>
+            <a:gs pos="0">
+              <a:schemeClr val="bg2">
+                <a:tint val="90000"/>
+                <a:satMod val="92000"/>
+                <a:lumMod val="120000"/>
+              </a:schemeClr>
+            </a:gs>
+            <a:gs pos="100000">
+              <a:schemeClr val="bg2">
+                <a:shade val="98000"/>
+                <a:satMod val="120000"/>
+                <a:lumMod val="98000"/>
+              </a:schemeClr>
+            </a:gs>
+          </a:gsLst>
+          <a:path path="circle">
+            <a:fillToRect l="50000" t="50000" r="100000" b="100000"/>
+          </a:path>
+        </a:gradFill>
+        <a:effectLst/>
+      </p:bgPr>
+    </p:bg>
     <p:spTree>
       <p:nvGrpSpPr>
         <p:cNvPr id="1" name=""/>
@@ -7684,6 +7712,123 @@
           <a:chExt cx="0" cy="0"/>
         </a:xfrm>
       </p:grpSpPr>
+      <p:sp useBgFill="1">
+        <p:nvSpPr>
+          <p:cNvPr id="18" name="Rectangle 17">
+            <a:extLst>
+              <a:ext uri="{FF2B5EF4-FFF2-40B4-BE49-F238E27FC236}">
+                <a16:creationId xmlns:a16="http://schemas.microsoft.com/office/drawing/2014/main" id="{A692209D-B607-46C3-8560-07AF72291659}"/>
+              </a:ext>
+              <a:ext uri="{C183D7F6-B498-43B3-948B-1728B52AA6E4}">
+                <adec:decorative xmlns:adec="http://schemas.microsoft.com/office/drawing/2017/decorative" val="1"/>
+              </a:ext>
+            </a:extLst>
+          </p:cNvPr>
+          <p:cNvSpPr>
+            <a:spLocks noGrp="1" noRot="1" noChangeAspect="1" noMove="1" noResize="1" noEditPoints="1" noAdjustHandles="1" noChangeArrowheads="1" noChangeShapeType="1" noTextEdit="1"/>
+          </p:cNvSpPr>
+          <p:nvPr>
+            <p:extLst>
+              <p:ext uri="{386F3935-93C4-4BCD-93E2-E3B085C9AB24}">
+                <p16:designElem xmlns:p16="http://schemas.microsoft.com/office/powerpoint/2015/main" val="1"/>
+              </p:ext>
+            </p:extLst>
+          </p:nvPr>
+        </p:nvSpPr>
+        <p:spPr>
+          <a:xfrm>
+            <a:off x="0" y="-786"/>
+            <a:ext cx="12192000" cy="6854038"/>
+          </a:xfrm>
+          <a:prstGeom prst="rect">
+            <a:avLst/>
+          </a:prstGeom>
+          <a:ln>
+            <a:noFill/>
+          </a:ln>
+        </p:spPr>
+        <p:style>
+          <a:lnRef idx="2">
+            <a:schemeClr val="accent1">
+              <a:shade val="50000"/>
+            </a:schemeClr>
+          </a:lnRef>
+          <a:fillRef idx="1">
+            <a:schemeClr val="accent1"/>
+          </a:fillRef>
+          <a:effectRef idx="0">
+            <a:schemeClr val="accent1"/>
+          </a:effectRef>
+          <a:fontRef idx="minor">
+            <a:schemeClr val="lt1"/>
+          </a:fontRef>
+        </p:style>
+        <p:txBody>
+          <a:bodyPr rtlCol="0" anchor="ctr"/>
+          <a:lstStyle/>
+          <a:p>
+            <a:pPr algn="ctr"/>
+            <a:endParaRPr lang="en-US"/>
+          </a:p>
+        </p:txBody>
+      </p:sp>
+      <p:sp>
+        <p:nvSpPr>
+          <p:cNvPr id="20" name="Rectangle 19">
+            <a:extLst>
+              <a:ext uri="{FF2B5EF4-FFF2-40B4-BE49-F238E27FC236}">
+                <a16:creationId xmlns:a16="http://schemas.microsoft.com/office/drawing/2014/main" id="{94874638-CF15-4908-BC4B-4908744D0BAF}"/>
+              </a:ext>
+              <a:ext uri="{C183D7F6-B498-43B3-948B-1728B52AA6E4}">
+                <adec:decorative xmlns:adec="http://schemas.microsoft.com/office/drawing/2017/decorative" val="1"/>
+              </a:ext>
+            </a:extLst>
+          </p:cNvPr>
+          <p:cNvSpPr>
+            <a:spLocks noGrp="1" noRot="1" noChangeAspect="1" noMove="1" noResize="1" noEditPoints="1" noAdjustHandles="1" noChangeArrowheads="1" noChangeShapeType="1" noTextEdit="1"/>
+          </p:cNvSpPr>
+          <p:nvPr>
+            <p:extLst>
+              <p:ext uri="{386F3935-93C4-4BCD-93E2-E3B085C9AB24}">
+                <p16:designElem xmlns:p16="http://schemas.microsoft.com/office/powerpoint/2015/main" val="1"/>
+              </p:ext>
+            </p:extLst>
+          </p:nvPr>
+        </p:nvSpPr>
+        <p:spPr bwMode="white">
+          <a:xfrm>
+            <a:off x="-1" y="0"/>
+            <a:ext cx="4639734" cy="6858000"/>
+          </a:xfrm>
+          <a:prstGeom prst="rect">
+            <a:avLst/>
+          </a:prstGeom>
+          <a:solidFill>
+            <a:schemeClr val="tx2">
+              <a:lumMod val="50000"/>
+              <a:alpha val="90000"/>
+            </a:schemeClr>
+          </a:solidFill>
+          <a:ln>
+            <a:noFill/>
+          </a:ln>
+          <a:effectLst/>
+        </p:spPr>
+        <p:style>
+          <a:lnRef idx="1">
+            <a:schemeClr val="accent1"/>
+          </a:lnRef>
+          <a:fillRef idx="3">
+            <a:schemeClr val="accent1"/>
+          </a:fillRef>
+          <a:effectRef idx="2">
+            <a:schemeClr val="accent1"/>
+          </a:effectRef>
+          <a:fontRef idx="minor">
+            <a:schemeClr val="lt1"/>
+          </a:fontRef>
+        </p:style>
+      </p:sp>
       <p:sp>
         <p:nvSpPr>
           <p:cNvPr id="2" name="Titolo 1">
@@ -7702,25 +7847,564 @@
         </p:nvSpPr>
         <p:spPr>
           <a:xfrm>
-            <a:off x="2589212" y="1733420"/>
-            <a:ext cx="8915399" cy="2262781"/>
+            <a:off x="540279" y="967417"/>
+            <a:ext cx="3778870" cy="3943250"/>
           </a:xfrm>
         </p:spPr>
         <p:txBody>
-          <a:bodyPr/>
+          <a:bodyPr>
+            <a:normAutofit/>
+          </a:bodyPr>
           <a:lstStyle/>
           <a:p>
             <a:r>
-              <a:rPr lang="it-IT" dirty="0"/>
+              <a:rPr lang="it-IT" sz="4000">
+                <a:solidFill>
+                  <a:srgbClr val="FEFFFF"/>
+                </a:solidFill>
+              </a:rPr>
               <a:t>Classificazione di segnali stradali</a:t>
             </a:r>
           </a:p>
         </p:txBody>
       </p:sp>
+      <p:sp>
+        <p:nvSpPr>
+          <p:cNvPr id="22" name="Freeform 5">
+            <a:extLst>
+              <a:ext uri="{FF2B5EF4-FFF2-40B4-BE49-F238E27FC236}">
+                <a16:creationId xmlns:a16="http://schemas.microsoft.com/office/drawing/2014/main" id="{5F1B8348-CD6E-4561-A704-C232D9A2676D}"/>
+              </a:ext>
+              <a:ext uri="{C183D7F6-B498-43B3-948B-1728B52AA6E4}">
+                <adec:decorative xmlns:adec="http://schemas.microsoft.com/office/drawing/2017/decorative" val="1"/>
+              </a:ext>
+            </a:extLst>
+          </p:cNvPr>
+          <p:cNvSpPr>
+            <a:spLocks noGrp="1" noRot="1" noChangeAspect="1" noMove="1" noResize="1" noEditPoints="1" noAdjustHandles="1" noChangeArrowheads="1" noChangeShapeType="1" noTextEdit="1"/>
+          </p:cNvSpPr>
+          <p:nvPr>
+            <p:extLst>
+              <p:ext uri="{386F3935-93C4-4BCD-93E2-E3B085C9AB24}">
+                <p16:designElem xmlns:p16="http://schemas.microsoft.com/office/powerpoint/2015/main" val="1"/>
+              </p:ext>
+            </p:extLst>
+          </p:nvPr>
+        </p:nvSpPr>
+        <p:spPr bwMode="grayWhite">
+          <a:xfrm>
+            <a:off x="0" y="5033007"/>
+            <a:ext cx="5404022" cy="857047"/>
+          </a:xfrm>
+          <a:custGeom>
+            <a:avLst/>
+            <a:gdLst>
+              <a:gd name="T0" fmla="*/ 1114 w 1117"/>
+              <a:gd name="T1" fmla="*/ 77 h 163"/>
+              <a:gd name="T2" fmla="*/ 1040 w 1117"/>
+              <a:gd name="T3" fmla="*/ 3 h 163"/>
+              <a:gd name="T4" fmla="*/ 1039 w 1117"/>
+              <a:gd name="T5" fmla="*/ 2 h 163"/>
+              <a:gd name="T6" fmla="*/ 1034 w 1117"/>
+              <a:gd name="T7" fmla="*/ 0 h 163"/>
+              <a:gd name="T8" fmla="*/ 578 w 1117"/>
+              <a:gd name="T9" fmla="*/ 0 h 163"/>
+              <a:gd name="T10" fmla="*/ 562 w 1117"/>
+              <a:gd name="T11" fmla="*/ 0 h 163"/>
+              <a:gd name="T12" fmla="*/ 440 w 1117"/>
+              <a:gd name="T13" fmla="*/ 0 h 163"/>
+              <a:gd name="T14" fmla="*/ 106 w 1117"/>
+              <a:gd name="T15" fmla="*/ 0 h 163"/>
+              <a:gd name="T16" fmla="*/ 0 w 1117"/>
+              <a:gd name="T17" fmla="*/ 0 h 163"/>
+              <a:gd name="T18" fmla="*/ 0 w 1117"/>
+              <a:gd name="T19" fmla="*/ 163 h 163"/>
+              <a:gd name="T20" fmla="*/ 106 w 1117"/>
+              <a:gd name="T21" fmla="*/ 163 h 163"/>
+              <a:gd name="T22" fmla="*/ 440 w 1117"/>
+              <a:gd name="T23" fmla="*/ 163 h 163"/>
+              <a:gd name="T24" fmla="*/ 562 w 1117"/>
+              <a:gd name="T25" fmla="*/ 163 h 163"/>
+              <a:gd name="T26" fmla="*/ 578 w 1117"/>
+              <a:gd name="T27" fmla="*/ 163 h 163"/>
+              <a:gd name="T28" fmla="*/ 1034 w 1117"/>
+              <a:gd name="T29" fmla="*/ 163 h 163"/>
+              <a:gd name="T30" fmla="*/ 1039 w 1117"/>
+              <a:gd name="T31" fmla="*/ 161 h 163"/>
+              <a:gd name="T32" fmla="*/ 1040 w 1117"/>
+              <a:gd name="T33" fmla="*/ 160 h 163"/>
+              <a:gd name="T34" fmla="*/ 1114 w 1117"/>
+              <a:gd name="T35" fmla="*/ 86 h 163"/>
+              <a:gd name="T36" fmla="*/ 1114 w 1117"/>
+              <a:gd name="T37" fmla="*/ 77 h 163"/>
+            </a:gdLst>
+            <a:ahLst/>
+            <a:cxnLst>
+              <a:cxn ang="0">
+                <a:pos x="T0" y="T1"/>
+              </a:cxn>
+              <a:cxn ang="0">
+                <a:pos x="T2" y="T3"/>
+              </a:cxn>
+              <a:cxn ang="0">
+                <a:pos x="T4" y="T5"/>
+              </a:cxn>
+              <a:cxn ang="0">
+                <a:pos x="T6" y="T7"/>
+              </a:cxn>
+              <a:cxn ang="0">
+                <a:pos x="T8" y="T9"/>
+              </a:cxn>
+              <a:cxn ang="0">
+                <a:pos x="T10" y="T11"/>
+              </a:cxn>
+              <a:cxn ang="0">
+                <a:pos x="T12" y="T13"/>
+              </a:cxn>
+              <a:cxn ang="0">
+                <a:pos x="T14" y="T15"/>
+              </a:cxn>
+              <a:cxn ang="0">
+                <a:pos x="T16" y="T17"/>
+              </a:cxn>
+              <a:cxn ang="0">
+                <a:pos x="T18" y="T19"/>
+              </a:cxn>
+              <a:cxn ang="0">
+                <a:pos x="T20" y="T21"/>
+              </a:cxn>
+              <a:cxn ang="0">
+                <a:pos x="T22" y="T23"/>
+              </a:cxn>
+              <a:cxn ang="0">
+                <a:pos x="T24" y="T25"/>
+              </a:cxn>
+              <a:cxn ang="0">
+                <a:pos x="T26" y="T27"/>
+              </a:cxn>
+              <a:cxn ang="0">
+                <a:pos x="T28" y="T29"/>
+              </a:cxn>
+              <a:cxn ang="0">
+                <a:pos x="T30" y="T31"/>
+              </a:cxn>
+              <a:cxn ang="0">
+                <a:pos x="T32" y="T33"/>
+              </a:cxn>
+              <a:cxn ang="0">
+                <a:pos x="T34" y="T35"/>
+              </a:cxn>
+              <a:cxn ang="0">
+                <a:pos x="T36" y="T37"/>
+              </a:cxn>
+            </a:cxnLst>
+            <a:rect l="0" t="0" r="r" b="b"/>
+            <a:pathLst>
+              <a:path w="1117" h="163">
+                <a:moveTo>
+                  <a:pt x="1114" y="77"/>
+                </a:moveTo>
+                <a:cubicBezTo>
+                  <a:pt x="1040" y="3"/>
+                  <a:pt x="1040" y="3"/>
+                  <a:pt x="1040" y="3"/>
+                </a:cubicBezTo>
+                <a:cubicBezTo>
+                  <a:pt x="1040" y="2"/>
+                  <a:pt x="1039" y="2"/>
+                  <a:pt x="1039" y="2"/>
+                </a:cubicBezTo>
+                <a:cubicBezTo>
+                  <a:pt x="1038" y="1"/>
+                  <a:pt x="1036" y="0"/>
+                  <a:pt x="1034" y="0"/>
+                </a:cubicBezTo>
+                <a:cubicBezTo>
+                  <a:pt x="578" y="0"/>
+                  <a:pt x="578" y="0"/>
+                  <a:pt x="578" y="0"/>
+                </a:cubicBezTo>
+                <a:cubicBezTo>
+                  <a:pt x="562" y="0"/>
+                  <a:pt x="562" y="0"/>
+                  <a:pt x="562" y="0"/>
+                </a:cubicBezTo>
+                <a:cubicBezTo>
+                  <a:pt x="440" y="0"/>
+                  <a:pt x="440" y="0"/>
+                  <a:pt x="440" y="0"/>
+                </a:cubicBezTo>
+                <a:cubicBezTo>
+                  <a:pt x="106" y="0"/>
+                  <a:pt x="106" y="0"/>
+                  <a:pt x="106" y="0"/>
+                </a:cubicBezTo>
+                <a:cubicBezTo>
+                  <a:pt x="0" y="0"/>
+                  <a:pt x="0" y="0"/>
+                  <a:pt x="0" y="0"/>
+                </a:cubicBezTo>
+                <a:cubicBezTo>
+                  <a:pt x="0" y="163"/>
+                  <a:pt x="0" y="163"/>
+                  <a:pt x="0" y="163"/>
+                </a:cubicBezTo>
+                <a:cubicBezTo>
+                  <a:pt x="106" y="163"/>
+                  <a:pt x="106" y="163"/>
+                  <a:pt x="106" y="163"/>
+                </a:cubicBezTo>
+                <a:cubicBezTo>
+                  <a:pt x="440" y="163"/>
+                  <a:pt x="440" y="163"/>
+                  <a:pt x="440" y="163"/>
+                </a:cubicBezTo>
+                <a:cubicBezTo>
+                  <a:pt x="562" y="163"/>
+                  <a:pt x="562" y="163"/>
+                  <a:pt x="562" y="163"/>
+                </a:cubicBezTo>
+                <a:cubicBezTo>
+                  <a:pt x="578" y="163"/>
+                  <a:pt x="578" y="163"/>
+                  <a:pt x="578" y="163"/>
+                </a:cubicBezTo>
+                <a:cubicBezTo>
+                  <a:pt x="1034" y="163"/>
+                  <a:pt x="1034" y="163"/>
+                  <a:pt x="1034" y="163"/>
+                </a:cubicBezTo>
+                <a:cubicBezTo>
+                  <a:pt x="1036" y="163"/>
+                  <a:pt x="1038" y="162"/>
+                  <a:pt x="1039" y="161"/>
+                </a:cubicBezTo>
+                <a:cubicBezTo>
+                  <a:pt x="1039" y="160"/>
+                  <a:pt x="1040" y="160"/>
+                  <a:pt x="1040" y="160"/>
+                </a:cubicBezTo>
+                <a:cubicBezTo>
+                  <a:pt x="1114" y="86"/>
+                  <a:pt x="1114" y="86"/>
+                  <a:pt x="1114" y="86"/>
+                </a:cubicBezTo>
+                <a:cubicBezTo>
+                  <a:pt x="1117" y="83"/>
+                  <a:pt x="1117" y="79"/>
+                  <a:pt x="1114" y="77"/>
+                </a:cubicBezTo>
+                <a:close/>
+              </a:path>
+            </a:pathLst>
+          </a:custGeom>
+          <a:solidFill>
+            <a:schemeClr val="accent1"/>
+          </a:solidFill>
+          <a:ln>
+            <a:noFill/>
+          </a:ln>
+        </p:spPr>
+        <p:txBody>
+          <a:bodyPr vert="horz" wrap="square" lIns="91440" tIns="45720" rIns="91440" bIns="45720" numCol="1" anchor="t" anchorCtr="0" compatLnSpc="1">
+            <a:prstTxWarp prst="textNoShape">
+              <a:avLst/>
+            </a:prstTxWarp>
+          </a:bodyPr>
+          <a:lstStyle/>
+          <a:p>
+            <a:endParaRPr lang="en-US"/>
+          </a:p>
+        </p:txBody>
+      </p:sp>
+      <p:pic>
+        <p:nvPicPr>
+          <p:cNvPr id="6" name="Immagine 5" descr="Immagine che contiene testo, clipart&#10;&#10;Descrizione generata automaticamente">
+            <a:extLst>
+              <a:ext uri="{FF2B5EF4-FFF2-40B4-BE49-F238E27FC236}">
+                <a16:creationId xmlns:a16="http://schemas.microsoft.com/office/drawing/2014/main" id="{FE31E03F-E4EB-C226-BC76-03C2DFC6F49D}"/>
+              </a:ext>
+            </a:extLst>
+          </p:cNvPr>
+          <p:cNvPicPr>
+            <a:picLocks noChangeAspect="1"/>
+          </p:cNvPicPr>
+          <p:nvPr/>
+        </p:nvPicPr>
+        <p:blipFill>
+          <a:blip r:embed="rId2">
+            <a:extLst>
+              <a:ext uri="{28A0092B-C50C-407E-A947-70E740481C1C}">
+                <a14:useLocalDpi xmlns:a14="http://schemas.microsoft.com/office/drawing/2010/main" val="0"/>
+              </a:ext>
+            </a:extLst>
+          </a:blip>
+          <a:stretch>
+            <a:fillRect/>
+          </a:stretch>
+        </p:blipFill>
+        <p:spPr>
+          <a:xfrm>
+            <a:off x="5587994" y="1674959"/>
+            <a:ext cx="6039118" cy="3763816"/>
+          </a:xfrm>
+          <a:prstGeom prst="rect">
+            <a:avLst/>
+          </a:prstGeom>
+        </p:spPr>
+      </p:pic>
     </p:spTree>
     <p:extLst>
       <p:ext uri="{BB962C8B-B14F-4D97-AF65-F5344CB8AC3E}">
         <p14:creationId xmlns:p14="http://schemas.microsoft.com/office/powerpoint/2010/main" val="3829558336"/>
+      </p:ext>
+    </p:extLst>
+  </p:cSld>
+  <p:clrMapOvr>
+    <a:masterClrMapping/>
+  </p:clrMapOvr>
+</p:sld>
+</file>
+
+<file path=ppt/slides/slide10.xml><?xml version="1.0" encoding="utf-8"?>
+<p:sld xmlns:a="http://schemas.openxmlformats.org/drawingml/2006/main" xmlns:r="http://schemas.openxmlformats.org/officeDocument/2006/relationships" xmlns:p="http://schemas.openxmlformats.org/presentationml/2006/main">
+  <p:cSld>
+    <p:spTree>
+      <p:nvGrpSpPr>
+        <p:cNvPr id="1" name=""/>
+        <p:cNvGrpSpPr/>
+        <p:nvPr/>
+      </p:nvGrpSpPr>
+      <p:grpSpPr>
+        <a:xfrm>
+          <a:off x="0" y="0"/>
+          <a:ext cx="0" cy="0"/>
+          <a:chOff x="0" y="0"/>
+          <a:chExt cx="0" cy="0"/>
+        </a:xfrm>
+      </p:grpSpPr>
+      <p:sp>
+        <p:nvSpPr>
+          <p:cNvPr id="2" name="Titolo 1">
+            <a:extLst>
+              <a:ext uri="{FF2B5EF4-FFF2-40B4-BE49-F238E27FC236}">
+                <a16:creationId xmlns:a16="http://schemas.microsoft.com/office/drawing/2014/main" id="{E1CFBCDC-E184-C230-FAEF-5A33546EB70D}"/>
+              </a:ext>
+            </a:extLst>
+          </p:cNvPr>
+          <p:cNvSpPr>
+            <a:spLocks noGrp="1"/>
+          </p:cNvSpPr>
+          <p:nvPr>
+            <p:ph type="title"/>
+          </p:nvPr>
+        </p:nvSpPr>
+        <p:spPr>
+          <a:xfrm>
+            <a:off x="2592925" y="624110"/>
+            <a:ext cx="8911687" cy="597787"/>
+          </a:xfrm>
+        </p:spPr>
+        <p:txBody>
+          <a:bodyPr>
+            <a:normAutofit fontScale="90000"/>
+          </a:bodyPr>
+          <a:lstStyle/>
+          <a:p>
+            <a:r>
+              <a:rPr lang="it-IT" dirty="0"/>
+              <a:t>5. Dataset</a:t>
+            </a:r>
+          </a:p>
+        </p:txBody>
+      </p:sp>
+      <p:sp>
+        <p:nvSpPr>
+          <p:cNvPr id="3" name="Segnaposto contenuto 2">
+            <a:extLst>
+              <a:ext uri="{FF2B5EF4-FFF2-40B4-BE49-F238E27FC236}">
+                <a16:creationId xmlns:a16="http://schemas.microsoft.com/office/drawing/2014/main" id="{56B05CCB-ACF3-691A-0384-8F577FF2E51E}"/>
+              </a:ext>
+            </a:extLst>
+          </p:cNvPr>
+          <p:cNvSpPr>
+            <a:spLocks noGrp="1"/>
+          </p:cNvSpPr>
+          <p:nvPr>
+            <p:ph idx="1"/>
+          </p:nvPr>
+        </p:nvSpPr>
+        <p:spPr>
+          <a:xfrm>
+            <a:off x="1883391" y="1459425"/>
+            <a:ext cx="10170845" cy="4886784"/>
+          </a:xfrm>
+        </p:spPr>
+        <p:txBody>
+          <a:bodyPr>
+            <a:normAutofit/>
+          </a:bodyPr>
+          <a:lstStyle/>
+          <a:p>
+            <a:r>
+              <a:rPr lang="it-IT" sz="2000" dirty="0"/>
+              <a:t>Il dataset di riferimento è composto da 876 immagini, suddivise nelle 4 categorie (semafori, limiti di velocità, stop e attraversamenti pedonali)</a:t>
+            </a:r>
+          </a:p>
+          <a:p>
+            <a:r>
+              <a:rPr lang="it-IT" sz="2000" dirty="0"/>
+              <a:t>Il dataset presenta una maggiore presenza di segnali di limiti di velocità. Per questo abbiamo ridotto il numero di immagini di tale categoria, riducendo </a:t>
+            </a:r>
+            <a:r>
+              <a:rPr lang="it-IT" sz="2000" b="1" dirty="0"/>
+              <a:t>l’</a:t>
+            </a:r>
+            <a:r>
+              <a:rPr lang="it-IT" sz="2000" b="1" dirty="0" err="1"/>
+              <a:t>overfitting</a:t>
+            </a:r>
+            <a:endParaRPr lang="it-IT" sz="2000" dirty="0"/>
+          </a:p>
+          <a:p>
+            <a:r>
+              <a:rPr lang="it-IT" sz="2000" dirty="0"/>
+              <a:t> Ad ogni immagine è associato un file .xml per l’estrazione dei dati di ogni foto del dataset.</a:t>
+            </a:r>
+          </a:p>
+          <a:p>
+            <a:r>
+              <a:rPr lang="it-IT" sz="2000" dirty="0"/>
+              <a:t>I campi di maggior rilievo sono :</a:t>
+            </a:r>
+          </a:p>
+          <a:p>
+            <a:pPr lvl="1">
+              <a:buFont typeface="+mj-lt"/>
+              <a:buAutoNum type="arabicPeriod"/>
+            </a:pPr>
+            <a:r>
+              <a:rPr lang="it-IT" sz="1800" dirty="0"/>
+              <a:t>Tag &lt;name&gt;: corrisponde alla categoria dell’immagine, dove nel nostro dataset sono 4.</a:t>
+            </a:r>
+          </a:p>
+          <a:p>
+            <a:pPr lvl="1">
+              <a:buFont typeface="+mj-lt"/>
+              <a:buAutoNum type="arabicPeriod"/>
+            </a:pPr>
+            <a:r>
+              <a:rPr lang="it-IT" sz="1800" dirty="0"/>
+              <a:t>&lt;</a:t>
+            </a:r>
+            <a:r>
+              <a:rPr lang="it-IT" sz="1800" dirty="0" err="1"/>
+              <a:t>bndbox</a:t>
+            </a:r>
+            <a:r>
+              <a:rPr lang="it-IT" sz="1800" dirty="0"/>
+              <a:t>&gt;: box che presenta le coordinate in cui si trova il segnale all’interno dell’immagine</a:t>
+            </a:r>
+          </a:p>
+        </p:txBody>
+      </p:sp>
+    </p:spTree>
+    <p:extLst>
+      <p:ext uri="{BB962C8B-B14F-4D97-AF65-F5344CB8AC3E}">
+        <p14:creationId xmlns:p14="http://schemas.microsoft.com/office/powerpoint/2010/main" val="2198489557"/>
+      </p:ext>
+    </p:extLst>
+  </p:cSld>
+  <p:clrMapOvr>
+    <a:masterClrMapping/>
+  </p:clrMapOvr>
+</p:sld>
+</file>
+
+<file path=ppt/slides/slide11.xml><?xml version="1.0" encoding="utf-8"?>
+<p:sld xmlns:a="http://schemas.openxmlformats.org/drawingml/2006/main" xmlns:r="http://schemas.openxmlformats.org/officeDocument/2006/relationships" xmlns:p="http://schemas.openxmlformats.org/presentationml/2006/main">
+  <p:cSld>
+    <p:spTree>
+      <p:nvGrpSpPr>
+        <p:cNvPr id="1" name=""/>
+        <p:cNvGrpSpPr/>
+        <p:nvPr/>
+      </p:nvGrpSpPr>
+      <p:grpSpPr>
+        <a:xfrm>
+          <a:off x="0" y="0"/>
+          <a:ext cx="0" cy="0"/>
+          <a:chOff x="0" y="0"/>
+          <a:chExt cx="0" cy="0"/>
+        </a:xfrm>
+      </p:grpSpPr>
+      <p:sp>
+        <p:nvSpPr>
+          <p:cNvPr id="2" name="Titolo 1">
+            <a:extLst>
+              <a:ext uri="{FF2B5EF4-FFF2-40B4-BE49-F238E27FC236}">
+                <a16:creationId xmlns:a16="http://schemas.microsoft.com/office/drawing/2014/main" id="{5B84AD69-8892-4CE6-2F58-AC0B2AB35A78}"/>
+              </a:ext>
+            </a:extLst>
+          </p:cNvPr>
+          <p:cNvSpPr>
+            <a:spLocks noGrp="1"/>
+          </p:cNvSpPr>
+          <p:nvPr>
+            <p:ph type="title"/>
+          </p:nvPr>
+        </p:nvSpPr>
+        <p:spPr/>
+        <p:txBody>
+          <a:bodyPr/>
+          <a:lstStyle/>
+          <a:p>
+            <a:r>
+              <a:rPr lang="it-IT" dirty="0"/>
+              <a:t>5. Dataset</a:t>
+            </a:r>
+          </a:p>
+        </p:txBody>
+      </p:sp>
+      <p:pic>
+        <p:nvPicPr>
+          <p:cNvPr id="5" name="Segnaposto contenuto 4" descr="Immagine che contiene testo&#10;&#10;Descrizione generata automaticamente">
+            <a:extLst>
+              <a:ext uri="{FF2B5EF4-FFF2-40B4-BE49-F238E27FC236}">
+                <a16:creationId xmlns:a16="http://schemas.microsoft.com/office/drawing/2014/main" id="{0C4BA519-8B31-0386-892B-435DFD434D3A}"/>
+              </a:ext>
+            </a:extLst>
+          </p:cNvPr>
+          <p:cNvPicPr>
+            <a:picLocks noGrp="1" noChangeAspect="1"/>
+          </p:cNvPicPr>
+          <p:nvPr>
+            <p:ph idx="1"/>
+          </p:nvPr>
+        </p:nvPicPr>
+        <p:blipFill>
+          <a:blip r:embed="rId2">
+            <a:extLst>
+              <a:ext uri="{28A0092B-C50C-407E-A947-70E740481C1C}">
+                <a14:useLocalDpi xmlns:a14="http://schemas.microsoft.com/office/drawing/2010/main" val="0"/>
+              </a:ext>
+            </a:extLst>
+          </a:blip>
+          <a:stretch>
+            <a:fillRect/>
+          </a:stretch>
+        </p:blipFill>
+        <p:spPr>
+          <a:xfrm>
+            <a:off x="4207098" y="1264555"/>
+            <a:ext cx="3425015" cy="4803775"/>
+          </a:xfrm>
+        </p:spPr>
+      </p:pic>
+    </p:spTree>
+    <p:extLst>
+      <p:ext uri="{BB962C8B-B14F-4D97-AF65-F5344CB8AC3E}">
+        <p14:creationId xmlns:p14="http://schemas.microsoft.com/office/powerpoint/2010/main" val="1858851659"/>
       </p:ext>
     </p:extLst>
   </p:cSld>
@@ -8108,13 +8792,154 @@
         </p:nvSpPr>
         <p:spPr/>
         <p:txBody>
-          <a:bodyPr/>
+          <a:bodyPr>
+            <a:normAutofit/>
+          </a:bodyPr>
           <a:lstStyle/>
           <a:p>
-            <a:endParaRPr lang="it-IT"/>
-          </a:p>
-        </p:txBody>
-      </p:sp>
+            <a:r>
+              <a:rPr lang="it-IT" sz="3000" dirty="0" err="1"/>
+              <a:t>TensorFlow</a:t>
+            </a:r>
+            <a:r>
+              <a:rPr lang="it-IT" sz="3000" dirty="0"/>
+              <a:t> </a:t>
+            </a:r>
+          </a:p>
+          <a:p>
+            <a:endParaRPr lang="it-IT" sz="3000" dirty="0"/>
+          </a:p>
+          <a:p>
+            <a:r>
+              <a:rPr lang="it-IT" sz="3000" dirty="0" err="1"/>
+              <a:t>Keras</a:t>
+            </a:r>
+            <a:endParaRPr lang="it-IT" sz="3000" dirty="0"/>
+          </a:p>
+          <a:p>
+            <a:endParaRPr lang="it-IT" sz="3000" dirty="0"/>
+          </a:p>
+          <a:p>
+            <a:r>
+              <a:rPr lang="it-IT" sz="3000" dirty="0"/>
+              <a:t>Google </a:t>
+            </a:r>
+            <a:r>
+              <a:rPr lang="it-IT" sz="3000" dirty="0" err="1"/>
+              <a:t>Colab</a:t>
+            </a:r>
+            <a:endParaRPr lang="it-IT" sz="3000" dirty="0"/>
+          </a:p>
+        </p:txBody>
+      </p:sp>
+      <p:pic>
+        <p:nvPicPr>
+          <p:cNvPr id="5" name="Immagine 4">
+            <a:extLst>
+              <a:ext uri="{FF2B5EF4-FFF2-40B4-BE49-F238E27FC236}">
+                <a16:creationId xmlns:a16="http://schemas.microsoft.com/office/drawing/2014/main" id="{77606A21-77FE-EC12-360B-A731975B8F6B}"/>
+              </a:ext>
+            </a:extLst>
+          </p:cNvPr>
+          <p:cNvPicPr>
+            <a:picLocks noChangeAspect="1"/>
+          </p:cNvPicPr>
+          <p:nvPr/>
+        </p:nvPicPr>
+        <p:blipFill>
+          <a:blip r:embed="rId2">
+            <a:extLst>
+              <a:ext uri="{28A0092B-C50C-407E-A947-70E740481C1C}">
+                <a14:useLocalDpi xmlns:a14="http://schemas.microsoft.com/office/drawing/2010/main" val="0"/>
+              </a:ext>
+            </a:extLst>
+          </a:blip>
+          <a:stretch>
+            <a:fillRect/>
+          </a:stretch>
+        </p:blipFill>
+        <p:spPr>
+          <a:xfrm>
+            <a:off x="9299144" y="3087929"/>
+            <a:ext cx="1045006" cy="1045006"/>
+          </a:xfrm>
+          <a:prstGeom prst="rect">
+            <a:avLst/>
+          </a:prstGeom>
+        </p:spPr>
+      </p:pic>
+      <p:pic>
+        <p:nvPicPr>
+          <p:cNvPr id="9" name="Immagine 8" descr="Immagine che contiene testo, materiale da costruzione, mattone&#10;&#10;Descrizione generata automaticamente">
+            <a:extLst>
+              <a:ext uri="{FF2B5EF4-FFF2-40B4-BE49-F238E27FC236}">
+                <a16:creationId xmlns:a16="http://schemas.microsoft.com/office/drawing/2014/main" id="{5F1512FA-5867-D985-6CFC-0392FD8E0617}"/>
+              </a:ext>
+            </a:extLst>
+          </p:cNvPr>
+          <p:cNvPicPr>
+            <a:picLocks noChangeAspect="1"/>
+          </p:cNvPicPr>
+          <p:nvPr/>
+        </p:nvPicPr>
+        <p:blipFill>
+          <a:blip r:embed="rId3">
+            <a:extLst>
+              <a:ext uri="{28A0092B-C50C-407E-A947-70E740481C1C}">
+                <a14:useLocalDpi xmlns:a14="http://schemas.microsoft.com/office/drawing/2010/main" val="0"/>
+              </a:ext>
+            </a:extLst>
+          </a:blip>
+          <a:stretch>
+            <a:fillRect/>
+          </a:stretch>
+        </p:blipFill>
+        <p:spPr>
+          <a:xfrm>
+            <a:off x="9344613" y="1881376"/>
+            <a:ext cx="999537" cy="1068629"/>
+          </a:xfrm>
+          <a:prstGeom prst="rect">
+            <a:avLst/>
+          </a:prstGeom>
+        </p:spPr>
+      </p:pic>
+      <p:pic>
+        <p:nvPicPr>
+          <p:cNvPr id="11" name="Immagine 10">
+            <a:extLst>
+              <a:ext uri="{FF2B5EF4-FFF2-40B4-BE49-F238E27FC236}">
+                <a16:creationId xmlns:a16="http://schemas.microsoft.com/office/drawing/2014/main" id="{C899909D-DF34-9DD9-99FC-EB188BCF07A6}"/>
+              </a:ext>
+            </a:extLst>
+          </p:cNvPr>
+          <p:cNvPicPr>
+            <a:picLocks noChangeAspect="1"/>
+          </p:cNvPicPr>
+          <p:nvPr/>
+        </p:nvPicPr>
+        <p:blipFill>
+          <a:blip r:embed="rId4">
+            <a:extLst>
+              <a:ext uri="{28A0092B-C50C-407E-A947-70E740481C1C}">
+                <a14:useLocalDpi xmlns:a14="http://schemas.microsoft.com/office/drawing/2010/main" val="0"/>
+              </a:ext>
+            </a:extLst>
+          </a:blip>
+          <a:stretch>
+            <a:fillRect/>
+          </a:stretch>
+        </p:blipFill>
+        <p:spPr>
+          <a:xfrm>
+            <a:off x="9300920" y="4255317"/>
+            <a:ext cx="1068630" cy="1068630"/>
+          </a:xfrm>
+          <a:prstGeom prst="rect">
+            <a:avLst/>
+          </a:prstGeom>
+        </p:spPr>
+      </p:pic>
     </p:spTree>
     <p:extLst>
       <p:ext uri="{BB962C8B-B14F-4D97-AF65-F5344CB8AC3E}">
@@ -8245,7 +9070,10 @@
               <a:buFont typeface="+mj-lt"/>
               <a:buAutoNum type="arabicPeriod"/>
             </a:pPr>
-            <a:endParaRPr lang="it-IT" dirty="0"/>
+            <a:r>
+              <a:rPr lang="it-IT" dirty="0"/>
+              <a:t>Dataset</a:t>
+            </a:r>
           </a:p>
           <a:p>
             <a:pPr marL="0" indent="0">
@@ -8340,12 +9168,14 @@
         </p:nvSpPr>
         <p:spPr>
           <a:xfrm>
-            <a:off x="2095598" y="1464658"/>
-            <a:ext cx="8915400" cy="2681161"/>
+            <a:off x="1998494" y="1464657"/>
+            <a:ext cx="9012504" cy="4460281"/>
           </a:xfrm>
         </p:spPr>
         <p:txBody>
-          <a:bodyPr/>
+          <a:bodyPr>
+            <a:normAutofit/>
+          </a:bodyPr>
           <a:lstStyle/>
           <a:p>
             <a:r>
@@ -8369,62 +9199,39 @@
             <a:endParaRPr lang="it-IT" dirty="0"/>
           </a:p>
           <a:p>
+            <a:r>
+              <a:rPr lang="it-IT" dirty="0"/>
+              <a:t>Obiettivo</a:t>
+            </a:r>
+          </a:p>
+          <a:p>
+            <a:pPr marL="0" indent="0">
+              <a:buNone/>
+            </a:pPr>
+            <a:r>
+              <a:rPr lang="it-IT" dirty="0"/>
+              <a:t>Con il nostro progetto intendiamo implementare un classificatore in grado di riconoscere diverse categorie di segnali (</a:t>
+            </a:r>
+            <a:r>
+              <a:rPr lang="it-IT" dirty="0" err="1"/>
+              <a:t>stop,semafori,limiti</a:t>
+            </a:r>
+            <a:r>
+              <a:rPr lang="it-IT" dirty="0"/>
+              <a:t> di velocità, attraversamenti pedonali)</a:t>
+            </a:r>
+          </a:p>
+          <a:p>
+            <a:endParaRPr lang="it-IT" dirty="0"/>
+          </a:p>
+          <a:p>
+            <a:endParaRPr lang="it-IT" dirty="0"/>
+          </a:p>
+          <a:p>
             <a:pPr marL="0" indent="0">
               <a:buNone/>
             </a:pPr>
             <a:endParaRPr lang="it-IT" dirty="0"/>
-          </a:p>
-        </p:txBody>
-      </p:sp>
-      <p:sp>
-        <p:nvSpPr>
-          <p:cNvPr id="4" name="CasellaDiTesto 3">
-            <a:extLst>
-              <a:ext uri="{FF2B5EF4-FFF2-40B4-BE49-F238E27FC236}">
-                <a16:creationId xmlns:a16="http://schemas.microsoft.com/office/drawing/2014/main" id="{762A8662-D9B7-FBE1-9725-42D035022206}"/>
-              </a:ext>
-            </a:extLst>
-          </p:cNvPr>
-          <p:cNvSpPr txBox="1"/>
-          <p:nvPr/>
-        </p:nvSpPr>
-        <p:spPr>
-          <a:xfrm>
-            <a:off x="2095598" y="4466804"/>
-            <a:ext cx="8911687" cy="1477328"/>
-          </a:xfrm>
-          <a:prstGeom prst="rect">
-            <a:avLst/>
-          </a:prstGeom>
-          <a:noFill/>
-        </p:spPr>
-        <p:txBody>
-          <a:bodyPr wrap="square" rtlCol="0">
-            <a:spAutoFit/>
-          </a:bodyPr>
-          <a:lstStyle/>
-          <a:p>
-            <a:r>
-              <a:rPr lang="it-IT" dirty="0"/>
-              <a:t>Obiettivo</a:t>
-            </a:r>
-          </a:p>
-          <a:p>
-            <a:endParaRPr lang="it-IT" dirty="0"/>
-          </a:p>
-          <a:p>
-            <a:r>
-              <a:rPr lang="it-IT" dirty="0"/>
-              <a:t>Con il nostro progetto intendiamo implementare un classificatore in grado di riconoscere diverse categorie di segnali (</a:t>
-            </a:r>
-            <a:r>
-              <a:rPr lang="it-IT" dirty="0" err="1"/>
-              <a:t>stop,semafori,limiti</a:t>
-            </a:r>
-            <a:r>
-              <a:rPr lang="it-IT" dirty="0"/>
-              <a:t> di velocità, attraversamenti pedonali)</a:t>
-            </a:r>
           </a:p>
         </p:txBody>
       </p:sp>
@@ -8502,12 +9309,105 @@
             <p:ph idx="1"/>
           </p:nvPr>
         </p:nvSpPr>
-        <p:spPr/>
-        <p:txBody>
-          <a:bodyPr/>
+        <p:spPr>
+          <a:xfrm>
+            <a:off x="1614196" y="1520890"/>
+            <a:ext cx="10105052" cy="4786604"/>
+          </a:xfrm>
+        </p:spPr>
+        <p:txBody>
+          <a:bodyPr>
+            <a:normAutofit/>
+          </a:bodyPr>
           <a:lstStyle/>
           <a:p>
-            <a:endParaRPr lang="it-IT"/>
+            <a:r>
+              <a:rPr lang="it-IT" dirty="0"/>
+              <a:t>PERFORMANCE	</a:t>
+            </a:r>
+          </a:p>
+          <a:p>
+            <a:pPr marL="0" indent="0">
+              <a:buNone/>
+            </a:pPr>
+            <a:r>
+              <a:rPr lang="it-IT" dirty="0"/>
+              <a:t>Immagini correttamente classificate / immagini totali</a:t>
+            </a:r>
+          </a:p>
+          <a:p>
+            <a:pPr marL="0" indent="0">
+              <a:buNone/>
+            </a:pPr>
+            <a:r>
+              <a:rPr lang="it-IT" dirty="0"/>
+              <a:t>					</a:t>
+            </a:r>
+          </a:p>
+          <a:p>
+            <a:r>
+              <a:rPr lang="it-IT" dirty="0"/>
+              <a:t>ENVIRONMENT			</a:t>
+            </a:r>
+          </a:p>
+          <a:p>
+            <a:pPr marL="0" indent="0">
+              <a:buNone/>
+            </a:pPr>
+            <a:r>
+              <a:rPr lang="it-IT" dirty="0"/>
+              <a:t>Dataset (apprendimento) – Collezione di immagini (applicazione)</a:t>
+            </a:r>
+          </a:p>
+          <a:p>
+            <a:endParaRPr lang="it-IT" dirty="0"/>
+          </a:p>
+          <a:p>
+            <a:r>
+              <a:rPr lang="it-IT" dirty="0"/>
+              <a:t>ACTUATORS</a:t>
+            </a:r>
+          </a:p>
+          <a:p>
+            <a:pPr marL="0" indent="0">
+              <a:buNone/>
+            </a:pPr>
+            <a:r>
+              <a:rPr lang="it-IT" dirty="0"/>
+              <a:t>Aggiornamento di </a:t>
+            </a:r>
+            <a:r>
+              <a:rPr lang="it-IT" dirty="0" err="1"/>
+              <a:t>bias</a:t>
+            </a:r>
+            <a:r>
+              <a:rPr lang="it-IT" dirty="0"/>
+              <a:t> e neuroni. Classificatore di immagini</a:t>
+            </a:r>
+          </a:p>
+          <a:p>
+            <a:endParaRPr lang="it-IT" dirty="0"/>
+          </a:p>
+          <a:p>
+            <a:r>
+              <a:rPr lang="it-IT" dirty="0"/>
+              <a:t>SENSOR</a:t>
+            </a:r>
+          </a:p>
+          <a:p>
+            <a:pPr marL="0" indent="0">
+              <a:buNone/>
+            </a:pPr>
+            <a:r>
+              <a:rPr lang="it-IT" dirty="0"/>
+              <a:t>Stato corrente del modello. Interfaccia per il caricamento delle immagini</a:t>
+            </a:r>
+          </a:p>
+          <a:p>
+            <a:pPr marL="0" indent="0">
+              <a:buNone/>
+            </a:pPr>
+            <a:endParaRPr lang="it-IT" dirty="0"/>
           </a:p>
         </p:txBody>
       </p:sp>
@@ -8562,35 +9462,48 @@
           <a:bodyPr/>
           <a:lstStyle/>
           <a:p>
-            <a:endParaRPr lang="it-IT"/>
-          </a:p>
-        </p:txBody>
-      </p:sp>
-      <p:sp>
-        <p:nvSpPr>
-          <p:cNvPr id="3" name="Segnaposto contenuto 2">
+            <a:r>
+              <a:rPr lang="it-IT" dirty="0"/>
+              <a:t>3. Struttura dell’agente</a:t>
+            </a:r>
+          </a:p>
+        </p:txBody>
+      </p:sp>
+      <p:pic>
+        <p:nvPicPr>
+          <p:cNvPr id="5" name="Segnaposto contenuto 4">
             <a:extLst>
               <a:ext uri="{FF2B5EF4-FFF2-40B4-BE49-F238E27FC236}">
-                <a16:creationId xmlns:a16="http://schemas.microsoft.com/office/drawing/2014/main" id="{BBB39AF3-181E-3856-7935-68C478ADBF4B}"/>
+                <a16:creationId xmlns:a16="http://schemas.microsoft.com/office/drawing/2014/main" id="{5A558136-CCF3-55AC-54AE-98C8DA8D53B9}"/>
               </a:ext>
             </a:extLst>
           </p:cNvPr>
-          <p:cNvSpPr>
-            <a:spLocks noGrp="1"/>
-          </p:cNvSpPr>
+          <p:cNvPicPr>
+            <a:picLocks noGrp="1" noChangeAspect="1"/>
+          </p:cNvPicPr>
           <p:nvPr>
             <p:ph idx="1"/>
           </p:nvPr>
-        </p:nvSpPr>
-        <p:spPr/>
-        <p:txBody>
-          <a:bodyPr/>
-          <a:lstStyle/>
-          <a:p>
-            <a:endParaRPr lang="it-IT"/>
-          </a:p>
-        </p:txBody>
-      </p:sp>
+        </p:nvPicPr>
+        <p:blipFill>
+          <a:blip r:embed="rId2">
+            <a:extLst>
+              <a:ext uri="{28A0092B-C50C-407E-A947-70E740481C1C}">
+                <a14:useLocalDpi xmlns:a14="http://schemas.microsoft.com/office/drawing/2010/main" val="0"/>
+              </a:ext>
+            </a:extLst>
+          </a:blip>
+          <a:stretch>
+            <a:fillRect/>
+          </a:stretch>
+        </p:blipFill>
+        <p:spPr>
+          <a:xfrm>
+            <a:off x="1855401" y="1306286"/>
+            <a:ext cx="8830482" cy="5206482"/>
+          </a:xfrm>
+        </p:spPr>
+      </p:pic>
     </p:spTree>
     <p:extLst>
       <p:ext uri="{BB962C8B-B14F-4D97-AF65-F5344CB8AC3E}">
@@ -8644,7 +9557,7 @@
           <a:p>
             <a:r>
               <a:rPr lang="it-IT" dirty="0"/>
-              <a:t>3. Algoritmo</a:t>
+              <a:t>4. Algoritmo</a:t>
             </a:r>
           </a:p>
         </p:txBody>
@@ -8667,13 +9580,13 @@
         </p:nvSpPr>
         <p:spPr>
           <a:xfrm>
-            <a:off x="2589212" y="2133600"/>
-            <a:ext cx="8915400" cy="3368984"/>
+            <a:off x="2122682" y="1611085"/>
+            <a:ext cx="8915400" cy="4257869"/>
           </a:xfrm>
         </p:spPr>
         <p:txBody>
           <a:bodyPr>
-            <a:normAutofit fontScale="92500" lnSpcReduction="20000"/>
+            <a:normAutofit/>
           </a:bodyPr>
           <a:lstStyle/>
           <a:p>
@@ -8715,7 +9628,7 @@
             </a:pPr>
             <a:r>
               <a:rPr lang="it-IT" dirty="0"/>
-              <a:t>I punti in questione sono dei pattern grafici, es. curve, angoli, circonferenze, quadrati, …</a:t>
+              <a:t>I punti in questione sono dei pattern grafici, come ad esempio curve, angoli, circonferenze, quadrati.</a:t>
             </a:r>
           </a:p>
           <a:p>
@@ -8783,7 +9696,7 @@
           <p:cNvPr id="2" name="Titolo 1">
             <a:extLst>
               <a:ext uri="{FF2B5EF4-FFF2-40B4-BE49-F238E27FC236}">
-                <a16:creationId xmlns:a16="http://schemas.microsoft.com/office/drawing/2014/main" id="{E1CFBCDC-E184-C230-FAEF-5A33546EB70D}"/>
+                <a16:creationId xmlns:a16="http://schemas.microsoft.com/office/drawing/2014/main" id="{605F6E8D-C07E-ECBC-FDE4-D43F4FC5E857}"/>
               </a:ext>
             </a:extLst>
           </p:cNvPr>
@@ -8794,21 +9707,14 @@
             <p:ph type="title"/>
           </p:nvPr>
         </p:nvSpPr>
-        <p:spPr>
-          <a:xfrm>
-            <a:off x="2592925" y="624110"/>
-            <a:ext cx="8911687" cy="597787"/>
-          </a:xfrm>
-        </p:spPr>
-        <p:txBody>
-          <a:bodyPr>
-            <a:normAutofit fontScale="90000"/>
-          </a:bodyPr>
+        <p:spPr/>
+        <p:txBody>
+          <a:bodyPr/>
           <a:lstStyle/>
           <a:p>
             <a:r>
               <a:rPr lang="it-IT" dirty="0"/>
-              <a:t>4. Dataset</a:t>
+              <a:t>4. Algoritmo</a:t>
             </a:r>
           </a:p>
         </p:txBody>
@@ -8818,7 +9724,7 @@
           <p:cNvPr id="3" name="Segnaposto contenuto 2">
             <a:extLst>
               <a:ext uri="{FF2B5EF4-FFF2-40B4-BE49-F238E27FC236}">
-                <a16:creationId xmlns:a16="http://schemas.microsoft.com/office/drawing/2014/main" id="{56B05CCB-ACF3-691A-0384-8F577FF2E51E}"/>
+                <a16:creationId xmlns:a16="http://schemas.microsoft.com/office/drawing/2014/main" id="{5ADD0DD2-3690-1C98-93AA-A6084C4600CC}"/>
               </a:ext>
             </a:extLst>
           </p:cNvPr>
@@ -8831,8 +9737,8 @@
         </p:nvSpPr>
         <p:spPr>
           <a:xfrm>
-            <a:off x="2592925" y="1445777"/>
-            <a:ext cx="8915400" cy="3777622"/>
+            <a:off x="1758788" y="1452464"/>
+            <a:ext cx="8915400" cy="4668417"/>
           </a:xfrm>
         </p:spPr>
         <p:txBody>
@@ -8840,33 +9746,159 @@
           <a:lstStyle/>
           <a:p>
             <a:r>
+              <a:rPr lang="it-IT" sz="2000" dirty="0"/>
+              <a:t>Definizione dei </a:t>
+            </a:r>
+            <a:r>
+              <a:rPr lang="it-IT" sz="2000" dirty="0" err="1"/>
+              <a:t>layers</a:t>
+            </a:r>
+            <a:r>
               <a:rPr lang="it-IT" dirty="0"/>
-              <a:t>Il dataset di riferimento è composto da ? immagini, suddivise nelle 4 categorie (semafori, limiti di velocità, stop e attraversamenti pedonali)</a:t>
-            </a:r>
-          </a:p>
-          <a:p>
+              <a:t>:</a:t>
+            </a:r>
+          </a:p>
+          <a:p>
+            <a:pPr>
+              <a:buFont typeface="+mj-lt"/>
+              <a:buAutoNum type="arabicPeriod"/>
+            </a:pPr>
+            <a:r>
+              <a:rPr lang="it-IT" b="1" dirty="0"/>
+              <a:t>Conv2D</a:t>
+            </a:r>
             <a:r>
               <a:rPr lang="it-IT" dirty="0"/>
-              <a:t>Breve descrizione data </a:t>
+              <a:t>: Il </a:t>
             </a:r>
             <a:r>
               <a:rPr lang="it-IT" dirty="0" err="1"/>
-              <a:t>cleaning</a:t>
-            </a:r>
-            <a:endParaRPr lang="it-IT" dirty="0"/>
-          </a:p>
-          <a:p>
+              <a:t>layer</a:t>
+            </a:r>
             <a:r>
               <a:rPr lang="it-IT" dirty="0"/>
-              <a:t> Link dataset originale: </a:t>
-            </a:r>
+              <a:t> di convoluzione che si occupa di estrarre le feature e attraverso il kernel (la matrice) con cui viene convoluto l’input per ottenere una feature </a:t>
+            </a:r>
+            <a:r>
+              <a:rPr lang="it-IT" dirty="0" err="1"/>
+              <a:t>map</a:t>
+            </a:r>
+            <a:r>
+              <a:rPr lang="it-IT" dirty="0"/>
+              <a:t>.</a:t>
+            </a:r>
+          </a:p>
+          <a:p>
+            <a:pPr>
+              <a:buFont typeface="+mj-lt"/>
+              <a:buAutoNum type="arabicPeriod"/>
+            </a:pPr>
+            <a:r>
+              <a:rPr lang="it-IT" b="1" dirty="0"/>
+              <a:t>MaxPool2D</a:t>
+            </a:r>
+            <a:r>
+              <a:rPr lang="it-IT" dirty="0"/>
+              <a:t>: si occupa di calcolare il valore massimo per ciascuna feature </a:t>
+            </a:r>
+            <a:r>
+              <a:rPr lang="it-IT" dirty="0" err="1"/>
+              <a:t>map</a:t>
+            </a:r>
+            <a:r>
+              <a:rPr lang="it-IT" dirty="0"/>
+              <a:t>. Crea una rappresentazione che comprende i valori qui presenti. </a:t>
+            </a:r>
+          </a:p>
+          <a:p>
+            <a:pPr>
+              <a:buFont typeface="+mj-lt"/>
+              <a:buAutoNum type="arabicPeriod"/>
+            </a:pPr>
+            <a:r>
+              <a:rPr lang="it-IT" b="1" dirty="0" err="1"/>
+              <a:t>Flattern</a:t>
+            </a:r>
+            <a:r>
+              <a:rPr lang="it-IT" dirty="0"/>
+              <a:t>: il </a:t>
+            </a:r>
+            <a:r>
+              <a:rPr lang="it-IT" dirty="0" err="1"/>
+              <a:t>layer</a:t>
+            </a:r>
+            <a:r>
+              <a:rPr lang="it-IT" dirty="0"/>
+              <a:t> che si occupa di rimuovere tutte le dimensioni dopo i </a:t>
+            </a:r>
+            <a:r>
+              <a:rPr lang="it-IT" dirty="0" err="1"/>
+              <a:t>layer</a:t>
+            </a:r>
+            <a:r>
+              <a:rPr lang="it-IT" dirty="0"/>
+              <a:t> di convoluzione (Conv2D, MaxPool2D) tranne una. </a:t>
+            </a:r>
+          </a:p>
+          <a:p>
+            <a:pPr>
+              <a:buFont typeface="+mj-lt"/>
+              <a:buAutoNum type="arabicPeriod"/>
+            </a:pPr>
+            <a:r>
+              <a:rPr lang="it-IT" b="1" dirty="0"/>
+              <a:t>Dropout: </a:t>
+            </a:r>
+            <a:r>
+              <a:rPr lang="it-IT" dirty="0"/>
+              <a:t>dei neuroni selezionati in maniera casuale vengono ignorati durante l’allenamento</a:t>
+            </a:r>
+            <a:r>
+              <a:rPr lang="it-IT" b="1" dirty="0"/>
+              <a:t> </a:t>
+            </a:r>
+          </a:p>
+          <a:p>
+            <a:pPr>
+              <a:buFont typeface="+mj-lt"/>
+              <a:buAutoNum type="arabicPeriod"/>
+            </a:pPr>
+            <a:r>
+              <a:rPr lang="it-IT" b="1" dirty="0"/>
+              <a:t>Dense: </a:t>
+            </a:r>
+            <a:r>
+              <a:rPr lang="it-IT" dirty="0" err="1"/>
+              <a:t>layer</a:t>
+            </a:r>
+            <a:r>
+              <a:rPr lang="it-IT" dirty="0"/>
+              <a:t> composto da </a:t>
+            </a:r>
+            <a:r>
+              <a:rPr lang="it-IT" b="1" dirty="0"/>
+              <a:t>n </a:t>
+            </a:r>
+            <a:r>
+              <a:rPr lang="it-IT" dirty="0"/>
+              <a:t>neuroni in cui gli input vengono pesati e, assieme al </a:t>
+            </a:r>
+            <a:r>
+              <a:rPr lang="it-IT" dirty="0" err="1"/>
+              <a:t>bias</a:t>
+            </a:r>
+            <a:r>
+              <a:rPr lang="it-IT" dirty="0"/>
+              <a:t>, vengono trasferiti attraverso la funzione di attivazione dell’output. </a:t>
+            </a:r>
+            <a:endParaRPr lang="it-IT" b="1" dirty="0"/>
           </a:p>
         </p:txBody>
       </p:sp>
     </p:spTree>
     <p:extLst>
       <p:ext uri="{BB962C8B-B14F-4D97-AF65-F5344CB8AC3E}">
-        <p14:creationId xmlns:p14="http://schemas.microsoft.com/office/powerpoint/2010/main" val="2198489557"/>
+        <p14:creationId xmlns:p14="http://schemas.microsoft.com/office/powerpoint/2010/main" val="441261301"/>
       </p:ext>
     </p:extLst>
   </p:cSld>

</xml_diff>

<commit_message>
Analisi e scrematura del dataset, formattazione dei dati con importazione delle librerie, estrazione delle feature, costruzione del dataframe e training e test set
</commit_message>
<xml_diff>
--- a/documentazione/Presentazione fia.pptx
+++ b/documentazione/Presentazione fia.pptx
@@ -310,7 +310,7 @@
           <a:p>
             <a:fld id="{D3007E90-0CF4-4B56-9D2F-9833898221B1}" type="datetimeFigureOut">
               <a:rPr lang="it-IT" smtClean="0"/>
-              <a:t>31/05/2022</a:t>
+              <a:t>14/06/2022</a:t>
             </a:fld>
             <a:endParaRPr lang="it-IT"/>
           </a:p>
@@ -648,7 +648,7 @@
           <a:p>
             <a:fld id="{D3007E90-0CF4-4B56-9D2F-9833898221B1}" type="datetimeFigureOut">
               <a:rPr lang="it-IT" smtClean="0"/>
-              <a:t>31/05/2022</a:t>
+              <a:t>14/06/2022</a:t>
             </a:fld>
             <a:endParaRPr lang="it-IT"/>
           </a:p>
@@ -1049,7 +1049,7 @@
           <a:p>
             <a:fld id="{D3007E90-0CF4-4B56-9D2F-9833898221B1}" type="datetimeFigureOut">
               <a:rPr lang="it-IT" smtClean="0"/>
-              <a:t>31/05/2022</a:t>
+              <a:t>14/06/2022</a:t>
             </a:fld>
             <a:endParaRPr lang="it-IT"/>
           </a:p>
@@ -1385,7 +1385,7 @@
           <a:p>
             <a:fld id="{D3007E90-0CF4-4B56-9D2F-9833898221B1}" type="datetimeFigureOut">
               <a:rPr lang="it-IT" smtClean="0"/>
-              <a:t>31/05/2022</a:t>
+              <a:t>14/06/2022</a:t>
             </a:fld>
             <a:endParaRPr lang="it-IT"/>
           </a:p>
@@ -1705,7 +1705,7 @@
           <a:p>
             <a:fld id="{D3007E90-0CF4-4B56-9D2F-9833898221B1}" type="datetimeFigureOut">
               <a:rPr lang="it-IT" smtClean="0"/>
-              <a:t>31/05/2022</a:t>
+              <a:t>14/06/2022</a:t>
             </a:fld>
             <a:endParaRPr lang="it-IT"/>
           </a:p>
@@ -2101,7 +2101,7 @@
           <a:p>
             <a:fld id="{D3007E90-0CF4-4B56-9D2F-9833898221B1}" type="datetimeFigureOut">
               <a:rPr lang="it-IT" smtClean="0"/>
-              <a:t>31/05/2022</a:t>
+              <a:t>14/06/2022</a:t>
             </a:fld>
             <a:endParaRPr lang="it-IT"/>
           </a:p>
@@ -2358,7 +2358,7 @@
           <a:p>
             <a:fld id="{D3007E90-0CF4-4B56-9D2F-9833898221B1}" type="datetimeFigureOut">
               <a:rPr lang="it-IT" smtClean="0"/>
-              <a:t>31/05/2022</a:t>
+              <a:t>14/06/2022</a:t>
             </a:fld>
             <a:endParaRPr lang="it-IT"/>
           </a:p>
@@ -2620,7 +2620,7 @@
           <a:p>
             <a:fld id="{D3007E90-0CF4-4B56-9D2F-9833898221B1}" type="datetimeFigureOut">
               <a:rPr lang="it-IT" smtClean="0"/>
-              <a:t>31/05/2022</a:t>
+              <a:t>14/06/2022</a:t>
             </a:fld>
             <a:endParaRPr lang="it-IT"/>
           </a:p>
@@ -2882,7 +2882,7 @@
           <a:p>
             <a:fld id="{D3007E90-0CF4-4B56-9D2F-9833898221B1}" type="datetimeFigureOut">
               <a:rPr lang="it-IT" smtClean="0"/>
-              <a:t>31/05/2022</a:t>
+              <a:t>14/06/2022</a:t>
             </a:fld>
             <a:endParaRPr lang="it-IT"/>
           </a:p>
@@ -3211,7 +3211,7 @@
           <a:p>
             <a:fld id="{D3007E90-0CF4-4B56-9D2F-9833898221B1}" type="datetimeFigureOut">
               <a:rPr lang="it-IT" smtClean="0"/>
-              <a:t>31/05/2022</a:t>
+              <a:t>14/06/2022</a:t>
             </a:fld>
             <a:endParaRPr lang="it-IT"/>
           </a:p>
@@ -3534,7 +3534,7 @@
           <a:p>
             <a:fld id="{D3007E90-0CF4-4B56-9D2F-9833898221B1}" type="datetimeFigureOut">
               <a:rPr lang="it-IT" smtClean="0"/>
-              <a:t>31/05/2022</a:t>
+              <a:t>14/06/2022</a:t>
             </a:fld>
             <a:endParaRPr lang="it-IT"/>
           </a:p>
@@ -3991,7 +3991,7 @@
           <a:p>
             <a:fld id="{D3007E90-0CF4-4B56-9D2F-9833898221B1}" type="datetimeFigureOut">
               <a:rPr lang="it-IT" smtClean="0"/>
-              <a:t>31/05/2022</a:t>
+              <a:t>14/06/2022</a:t>
             </a:fld>
             <a:endParaRPr lang="it-IT"/>
           </a:p>
@@ -4196,7 +4196,7 @@
           <a:p>
             <a:fld id="{D3007E90-0CF4-4B56-9D2F-9833898221B1}" type="datetimeFigureOut">
               <a:rPr lang="it-IT" smtClean="0"/>
-              <a:t>31/05/2022</a:t>
+              <a:t>14/06/2022</a:t>
             </a:fld>
             <a:endParaRPr lang="it-IT"/>
           </a:p>
@@ -4373,7 +4373,7 @@
           <a:p>
             <a:fld id="{D3007E90-0CF4-4B56-9D2F-9833898221B1}" type="datetimeFigureOut">
               <a:rPr lang="it-IT" smtClean="0"/>
-              <a:t>31/05/2022</a:t>
+              <a:t>14/06/2022</a:t>
             </a:fld>
             <a:endParaRPr lang="it-IT"/>
           </a:p>
@@ -4706,7 +4706,7 @@
           <a:p>
             <a:fld id="{D3007E90-0CF4-4B56-9D2F-9833898221B1}" type="datetimeFigureOut">
               <a:rPr lang="it-IT" smtClean="0"/>
-              <a:t>31/05/2022</a:t>
+              <a:t>14/06/2022</a:t>
             </a:fld>
             <a:endParaRPr lang="it-IT"/>
           </a:p>
@@ -5051,7 +5051,7 @@
           <a:p>
             <a:fld id="{D3007E90-0CF4-4B56-9D2F-9833898221B1}" type="datetimeFigureOut">
               <a:rPr lang="it-IT" smtClean="0"/>
-              <a:t>31/05/2022</a:t>
+              <a:t>14/06/2022</a:t>
             </a:fld>
             <a:endParaRPr lang="it-IT"/>
           </a:p>
@@ -7168,7 +7168,7 @@
           <a:p>
             <a:fld id="{D3007E90-0CF4-4B56-9D2F-9833898221B1}" type="datetimeFigureOut">
               <a:rPr lang="it-IT" smtClean="0"/>
-              <a:t>31/05/2022</a:t>
+              <a:t>14/06/2022</a:t>
             </a:fld>
             <a:endParaRPr lang="it-IT"/>
           </a:p>
@@ -8254,22 +8254,13 @@
           <a:p>
             <a:r>
               <a:rPr lang="it-IT" sz="2000" dirty="0"/>
-              <a:t>Il dataset presenta una maggiore presenza di segnali di limiti di velocità. Per questo abbiamo ridotto il numero di immagini di tale categoria, riducendo </a:t>
-            </a:r>
-            <a:r>
-              <a:rPr lang="it-IT" sz="2000" b="1" dirty="0"/>
-              <a:t>l’</a:t>
-            </a:r>
-            <a:r>
-              <a:rPr lang="it-IT" sz="2000" b="1" dirty="0" err="1"/>
-              <a:t>overfitting</a:t>
-            </a:r>
-            <a:endParaRPr lang="it-IT" sz="2000" dirty="0"/>
+              <a:t>Il dataset presenta una maggiore presenza di segnali di limiti di velocità. Per questo abbiamo ridotto il numero di immagini di tale categoria all’interno del codice per bilanciare il dataset in fase di esecuzione.</a:t>
+            </a:r>
           </a:p>
           <a:p>
             <a:r>
               <a:rPr lang="it-IT" sz="2000" dirty="0"/>
-              <a:t> Ad ogni immagine è associato un file .xml per l’estrazione dei dati di ogni foto del dataset.</a:t>
+              <a:t>Ad ogni immagine è associato un file .xml per l’estrazione dei dati di ogni foto del dataset.</a:t>
             </a:r>
           </a:p>
           <a:p>

</xml_diff>

<commit_message>
Inserimento cap.4 Algoritmo di classificazione, terminare il glossario
</commit_message>
<xml_diff>
--- a/documentazione/Presentazione fia.pptx
+++ b/documentazione/Presentazione fia.pptx
@@ -310,7 +310,7 @@
           <a:p>
             <a:fld id="{D3007E90-0CF4-4B56-9D2F-9833898221B1}" type="datetimeFigureOut">
               <a:rPr lang="it-IT" smtClean="0"/>
-              <a:t>14/06/2022</a:t>
+              <a:t>22/06/2022</a:t>
             </a:fld>
             <a:endParaRPr lang="it-IT"/>
           </a:p>
@@ -648,7 +648,7 @@
           <a:p>
             <a:fld id="{D3007E90-0CF4-4B56-9D2F-9833898221B1}" type="datetimeFigureOut">
               <a:rPr lang="it-IT" smtClean="0"/>
-              <a:t>14/06/2022</a:t>
+              <a:t>22/06/2022</a:t>
             </a:fld>
             <a:endParaRPr lang="it-IT"/>
           </a:p>
@@ -1049,7 +1049,7 @@
           <a:p>
             <a:fld id="{D3007E90-0CF4-4B56-9D2F-9833898221B1}" type="datetimeFigureOut">
               <a:rPr lang="it-IT" smtClean="0"/>
-              <a:t>14/06/2022</a:t>
+              <a:t>22/06/2022</a:t>
             </a:fld>
             <a:endParaRPr lang="it-IT"/>
           </a:p>
@@ -1385,7 +1385,7 @@
           <a:p>
             <a:fld id="{D3007E90-0CF4-4B56-9D2F-9833898221B1}" type="datetimeFigureOut">
               <a:rPr lang="it-IT" smtClean="0"/>
-              <a:t>14/06/2022</a:t>
+              <a:t>22/06/2022</a:t>
             </a:fld>
             <a:endParaRPr lang="it-IT"/>
           </a:p>
@@ -1705,7 +1705,7 @@
           <a:p>
             <a:fld id="{D3007E90-0CF4-4B56-9D2F-9833898221B1}" type="datetimeFigureOut">
               <a:rPr lang="it-IT" smtClean="0"/>
-              <a:t>14/06/2022</a:t>
+              <a:t>22/06/2022</a:t>
             </a:fld>
             <a:endParaRPr lang="it-IT"/>
           </a:p>
@@ -2101,7 +2101,7 @@
           <a:p>
             <a:fld id="{D3007E90-0CF4-4B56-9D2F-9833898221B1}" type="datetimeFigureOut">
               <a:rPr lang="it-IT" smtClean="0"/>
-              <a:t>14/06/2022</a:t>
+              <a:t>22/06/2022</a:t>
             </a:fld>
             <a:endParaRPr lang="it-IT"/>
           </a:p>
@@ -2358,7 +2358,7 @@
           <a:p>
             <a:fld id="{D3007E90-0CF4-4B56-9D2F-9833898221B1}" type="datetimeFigureOut">
               <a:rPr lang="it-IT" smtClean="0"/>
-              <a:t>14/06/2022</a:t>
+              <a:t>22/06/2022</a:t>
             </a:fld>
             <a:endParaRPr lang="it-IT"/>
           </a:p>
@@ -2620,7 +2620,7 @@
           <a:p>
             <a:fld id="{D3007E90-0CF4-4B56-9D2F-9833898221B1}" type="datetimeFigureOut">
               <a:rPr lang="it-IT" smtClean="0"/>
-              <a:t>14/06/2022</a:t>
+              <a:t>22/06/2022</a:t>
             </a:fld>
             <a:endParaRPr lang="it-IT"/>
           </a:p>
@@ -2882,7 +2882,7 @@
           <a:p>
             <a:fld id="{D3007E90-0CF4-4B56-9D2F-9833898221B1}" type="datetimeFigureOut">
               <a:rPr lang="it-IT" smtClean="0"/>
-              <a:t>14/06/2022</a:t>
+              <a:t>22/06/2022</a:t>
             </a:fld>
             <a:endParaRPr lang="it-IT"/>
           </a:p>
@@ -3211,7 +3211,7 @@
           <a:p>
             <a:fld id="{D3007E90-0CF4-4B56-9D2F-9833898221B1}" type="datetimeFigureOut">
               <a:rPr lang="it-IT" smtClean="0"/>
-              <a:t>14/06/2022</a:t>
+              <a:t>22/06/2022</a:t>
             </a:fld>
             <a:endParaRPr lang="it-IT"/>
           </a:p>
@@ -3534,7 +3534,7 @@
           <a:p>
             <a:fld id="{D3007E90-0CF4-4B56-9D2F-9833898221B1}" type="datetimeFigureOut">
               <a:rPr lang="it-IT" smtClean="0"/>
-              <a:t>14/06/2022</a:t>
+              <a:t>22/06/2022</a:t>
             </a:fld>
             <a:endParaRPr lang="it-IT"/>
           </a:p>
@@ -3991,7 +3991,7 @@
           <a:p>
             <a:fld id="{D3007E90-0CF4-4B56-9D2F-9833898221B1}" type="datetimeFigureOut">
               <a:rPr lang="it-IT" smtClean="0"/>
-              <a:t>14/06/2022</a:t>
+              <a:t>22/06/2022</a:t>
             </a:fld>
             <a:endParaRPr lang="it-IT"/>
           </a:p>
@@ -4196,7 +4196,7 @@
           <a:p>
             <a:fld id="{D3007E90-0CF4-4B56-9D2F-9833898221B1}" type="datetimeFigureOut">
               <a:rPr lang="it-IT" smtClean="0"/>
-              <a:t>14/06/2022</a:t>
+              <a:t>22/06/2022</a:t>
             </a:fld>
             <a:endParaRPr lang="it-IT"/>
           </a:p>
@@ -4373,7 +4373,7 @@
           <a:p>
             <a:fld id="{D3007E90-0CF4-4B56-9D2F-9833898221B1}" type="datetimeFigureOut">
               <a:rPr lang="it-IT" smtClean="0"/>
-              <a:t>14/06/2022</a:t>
+              <a:t>22/06/2022</a:t>
             </a:fld>
             <a:endParaRPr lang="it-IT"/>
           </a:p>
@@ -4706,7 +4706,7 @@
           <a:p>
             <a:fld id="{D3007E90-0CF4-4B56-9D2F-9833898221B1}" type="datetimeFigureOut">
               <a:rPr lang="it-IT" smtClean="0"/>
-              <a:t>14/06/2022</a:t>
+              <a:t>22/06/2022</a:t>
             </a:fld>
             <a:endParaRPr lang="it-IT"/>
           </a:p>
@@ -5051,7 +5051,7 @@
           <a:p>
             <a:fld id="{D3007E90-0CF4-4B56-9D2F-9833898221B1}" type="datetimeFigureOut">
               <a:rPr lang="it-IT" smtClean="0"/>
-              <a:t>14/06/2022</a:t>
+              <a:t>22/06/2022</a:t>
             </a:fld>
             <a:endParaRPr lang="it-IT"/>
           </a:p>
@@ -7168,7 +7168,7 @@
           <a:p>
             <a:fld id="{D3007E90-0CF4-4B56-9D2F-9833898221B1}" type="datetimeFigureOut">
               <a:rPr lang="it-IT" smtClean="0"/>
-              <a:t>14/06/2022</a:t>
+              <a:t>22/06/2022</a:t>
             </a:fld>
             <a:endParaRPr lang="it-IT"/>
           </a:p>
@@ -9768,7 +9768,15 @@
             </a:r>
             <a:r>
               <a:rPr lang="it-IT" dirty="0"/>
-              <a:t> di convoluzione che si occupa di estrarre le feature e attraverso il kernel (la matrice) con cui viene convoluto l’input per ottenere una feature </a:t>
+              <a:t> di convoluzione che si occupa di estrarre </a:t>
+            </a:r>
+            <a:r>
+              <a:rPr lang="it-IT"/>
+              <a:t>le features </a:t>
+            </a:r>
+            <a:r>
+              <a:rPr lang="it-IT" dirty="0"/>
+              <a:t>e attraverso il kernel (la matrice) con cui viene convoluto l’input per ottenere una feature </a:t>
             </a:r>
             <a:r>
               <a:rPr lang="it-IT" dirty="0" err="1"/>
@@ -9808,7 +9816,7 @@
             </a:pPr>
             <a:r>
               <a:rPr lang="it-IT" b="1" dirty="0" err="1"/>
-              <a:t>Flattern</a:t>
+              <a:t>Flatten</a:t>
             </a:r>
             <a:r>
               <a:rPr lang="it-IT" dirty="0"/>

</xml_diff>